<commit_message>
continued working on it.
</commit_message>
<xml_diff>
--- a/Week 1 - Mathematic introduction/NNDL - Fall 18 Week 1 - Administration and basics.pptx
+++ b/Week 1 - Mathematic introduction/NNDL - Fall 18 Week 1 - Administration and basics.pptx
@@ -11,10 +11,11 @@
     <p:sldId id="259" r:id="rId5"/>
     <p:sldId id="260" r:id="rId6"/>
     <p:sldId id="261" r:id="rId7"/>
-    <p:sldId id="262" r:id="rId8"/>
-    <p:sldId id="263" r:id="rId9"/>
-    <p:sldId id="264" r:id="rId10"/>
-    <p:sldId id="265" r:id="rId11"/>
+    <p:sldId id="266" r:id="rId8"/>
+    <p:sldId id="262" r:id="rId9"/>
+    <p:sldId id="263" r:id="rId10"/>
+    <p:sldId id="264" r:id="rId11"/>
+    <p:sldId id="265" r:id="rId12"/>
   </p:sldIdLst>
   <p:sldSz cx="12192000" cy="6858000"/>
   <p:notesSz cx="6858000" cy="9144000"/>
@@ -113,6 +114,11 @@
       </a:defRPr>
     </a:lvl9pPr>
   </p:defaultTextStyle>
+  <p:extLst>
+    <p:ext uri="{EFAFB233-063F-42B5-8137-9DF3F51BA10A}">
+      <p15:sldGuideLst xmlns:p15="http://schemas.microsoft.com/office/powerpoint/2012/main"/>
+    </p:ext>
+  </p:extLst>
 </p:presentation>
 </file>
 
@@ -2771,7 +2777,7 @@
         <p:spPr>
           <a:xfrm>
             <a:off x="3045368" y="4074718"/>
-            <a:ext cx="6105194" cy="682079"/>
+            <a:ext cx="6105194" cy="968337"/>
           </a:xfrm>
         </p:spPr>
         <p:txBody>
@@ -2781,7 +2787,7 @@
           <a:lstStyle/>
           <a:p>
             <a:r>
-              <a:rPr lang="en-GB" sz="1500" b="1">
+              <a:rPr lang="en-GB" sz="1800" b="1" dirty="0">
                 <a:solidFill>
                   <a:srgbClr val="FFFFFF"/>
                 </a:solidFill>
@@ -2789,14 +2795,14 @@
               <a:t>An introductory course about theoretical fundamentals, case studies</a:t>
             </a:r>
             <a:br>
-              <a:rPr lang="en-GB" sz="1500" b="1">
+              <a:rPr lang="en-GB" sz="1800" b="1" dirty="0">
                 <a:solidFill>
                   <a:srgbClr val="FFFFFF"/>
                 </a:solidFill>
               </a:rPr>
             </a:br>
             <a:r>
-              <a:rPr lang="en-GB" sz="1500" b="1">
+              <a:rPr lang="en-GB" sz="1800" b="1" dirty="0">
                 <a:solidFill>
                   <a:srgbClr val="FFFFFF"/>
                 </a:solidFill>
@@ -2865,6 +2871,383 @@
 </file>
 
 <file path=ppt/slides/slide10.xml><?xml version="1.0" encoding="utf-8"?>
+<p:sld xmlns:a="http://schemas.openxmlformats.org/drawingml/2006/main" xmlns:r="http://schemas.openxmlformats.org/officeDocument/2006/relationships" xmlns:p="http://schemas.openxmlformats.org/presentationml/2006/main">
+  <p:cSld>
+    <p:bg>
+      <p:bgPr>
+        <a:solidFill>
+          <a:schemeClr val="bg1"/>
+        </a:solidFill>
+        <a:effectLst/>
+      </p:bgPr>
+    </p:bg>
+    <p:spTree>
+      <p:nvGrpSpPr>
+        <p:cNvPr id="1" name=""/>
+        <p:cNvGrpSpPr/>
+        <p:nvPr/>
+      </p:nvGrpSpPr>
+      <p:grpSpPr>
+        <a:xfrm>
+          <a:off x="0" y="0"/>
+          <a:ext cx="0" cy="0"/>
+          <a:chOff x="0" y="0"/>
+          <a:chExt cx="0" cy="0"/>
+        </a:xfrm>
+      </p:grpSpPr>
+      <p:sp>
+        <p:nvSpPr>
+          <p:cNvPr id="8" name="Rectangle 7">
+            <a:extLst>
+              <a:ext uri="{FF2B5EF4-FFF2-40B4-BE49-F238E27FC236}">
+                <a16:creationId xmlns:a16="http://schemas.microsoft.com/office/drawing/2014/main" id="{8D70B121-56F4-4848-B38B-182089D909FA}"/>
+              </a:ext>
+              <a:ext uri="{C183D7F6-B498-43B3-948B-1728B52AA6E4}">
+                <adec:decorative xmlns:adec="http://schemas.microsoft.com/office/drawing/2017/decorative" val="1"/>
+              </a:ext>
+            </a:extLst>
+          </p:cNvPr>
+          <p:cNvSpPr>
+            <a:spLocks noGrp="1" noRot="1" noChangeAspect="1" noMove="1" noResize="1" noEditPoints="1" noAdjustHandles="1" noChangeArrowheads="1" noChangeShapeType="1" noTextEdit="1"/>
+          </p:cNvSpPr>
+          <p:nvPr>
+            <p:extLst>
+              <p:ext uri="{386F3935-93C4-4BCD-93E2-E3B085C9AB24}">
+                <p16:designElem xmlns:p16="http://schemas.microsoft.com/office/powerpoint/2015/main" val="1"/>
+              </p:ext>
+            </p:extLst>
+          </p:nvPr>
+        </p:nvSpPr>
+        <p:spPr bwMode="ltGray">
+          <a:xfrm>
+            <a:off x="321564" y="320040"/>
+            <a:ext cx="11548872" cy="6217920"/>
+          </a:xfrm>
+          <a:prstGeom prst="rect">
+            <a:avLst/>
+          </a:prstGeom>
+          <a:solidFill>
+            <a:schemeClr val="tx1">
+              <a:alpha val="8000"/>
+            </a:schemeClr>
+          </a:solidFill>
+          <a:ln w="127000" cap="sq" cmpd="thinThick">
+            <a:noFill/>
+          </a:ln>
+        </p:spPr>
+        <p:style>
+          <a:lnRef idx="2">
+            <a:schemeClr val="accent1">
+              <a:shade val="50000"/>
+            </a:schemeClr>
+          </a:lnRef>
+          <a:fillRef idx="1">
+            <a:schemeClr val="accent1"/>
+          </a:fillRef>
+          <a:effectRef idx="0">
+            <a:schemeClr val="accent1"/>
+          </a:effectRef>
+          <a:fontRef idx="minor">
+            <a:schemeClr val="lt1"/>
+          </a:fontRef>
+        </p:style>
+        <p:txBody>
+          <a:bodyPr rtlCol="0" anchor="ctr"/>
+          <a:lstStyle/>
+          <a:p>
+            <a:pPr algn="ctr"/>
+            <a:endParaRPr lang="en-US"/>
+          </a:p>
+        </p:txBody>
+      </p:sp>
+      <p:sp>
+        <p:nvSpPr>
+          <p:cNvPr id="2" name="Title 1">
+            <a:extLst>
+              <a:ext uri="{FF2B5EF4-FFF2-40B4-BE49-F238E27FC236}">
+                <a16:creationId xmlns:a16="http://schemas.microsoft.com/office/drawing/2014/main" id="{6763B5EE-D347-47DD-A71D-182D0BEC7DA8}"/>
+              </a:ext>
+            </a:extLst>
+          </p:cNvPr>
+          <p:cNvSpPr>
+            <a:spLocks noGrp="1"/>
+          </p:cNvSpPr>
+          <p:nvPr>
+            <p:ph type="title"/>
+          </p:nvPr>
+        </p:nvSpPr>
+        <p:spPr>
+          <a:xfrm>
+            <a:off x="838200" y="963877"/>
+            <a:ext cx="3494362" cy="4930246"/>
+          </a:xfrm>
+        </p:spPr>
+        <p:txBody>
+          <a:bodyPr>
+            <a:normAutofit/>
+          </a:bodyPr>
+          <a:lstStyle/>
+          <a:p>
+            <a:pPr algn="r"/>
+            <a:r>
+              <a:rPr lang="de-CH" sz="5400" dirty="0">
+                <a:solidFill>
+                  <a:schemeClr val="accent1"/>
+                </a:solidFill>
+              </a:rPr>
+              <a:t>How to </a:t>
+            </a:r>
+            <a:r>
+              <a:rPr lang="de-CH" sz="5400" dirty="0" err="1">
+                <a:solidFill>
+                  <a:schemeClr val="accent1"/>
+                </a:solidFill>
+              </a:rPr>
+              <a:t>create</a:t>
+            </a:r>
+            <a:r>
+              <a:rPr lang="de-CH" sz="5400" dirty="0">
+                <a:solidFill>
+                  <a:schemeClr val="accent1"/>
+                </a:solidFill>
+              </a:rPr>
+              <a:t> an </a:t>
+            </a:r>
+            <a:r>
+              <a:rPr lang="de-CH" sz="5400" dirty="0" err="1">
+                <a:solidFill>
+                  <a:schemeClr val="accent1"/>
+                </a:solidFill>
+              </a:rPr>
+              <a:t>issue</a:t>
+            </a:r>
+            <a:r>
+              <a:rPr lang="de-CH" sz="5400" dirty="0">
+                <a:solidFill>
+                  <a:schemeClr val="accent1"/>
+                </a:solidFill>
+              </a:rPr>
+              <a:t> in </a:t>
+            </a:r>
+            <a:r>
+              <a:rPr lang="de-CH" sz="5400" dirty="0" err="1">
+                <a:solidFill>
+                  <a:schemeClr val="accent1"/>
+                </a:solidFill>
+              </a:rPr>
+              <a:t>github</a:t>
+            </a:r>
+            <a:endParaRPr lang="en-CH" sz="5400" dirty="0">
+              <a:solidFill>
+                <a:schemeClr val="accent1"/>
+              </a:solidFill>
+            </a:endParaRPr>
+          </a:p>
+        </p:txBody>
+      </p:sp>
+      <p:cxnSp>
+        <p:nvCxnSpPr>
+          <p:cNvPr id="10" name="Straight Connector 9">
+            <a:extLst>
+              <a:ext uri="{FF2B5EF4-FFF2-40B4-BE49-F238E27FC236}">
+                <a16:creationId xmlns:a16="http://schemas.microsoft.com/office/drawing/2014/main" id="{2D72A2C9-F3CA-4216-8BAD-FA4C970C3C4E}"/>
+              </a:ext>
+              <a:ext uri="{C183D7F6-B498-43B3-948B-1728B52AA6E4}">
+                <adec:decorative xmlns:adec="http://schemas.microsoft.com/office/drawing/2017/decorative" val="1"/>
+              </a:ext>
+            </a:extLst>
+          </p:cNvPr>
+          <p:cNvCxnSpPr>
+            <a:cxnSpLocks noGrp="1" noRot="1" noChangeAspect="1" noMove="1" noResize="1" noEditPoints="1" noAdjustHandles="1" noChangeArrowheads="1" noChangeShapeType="1"/>
+          </p:cNvCxnSpPr>
+          <p:nvPr>
+            <p:extLst>
+              <p:ext uri="{386F3935-93C4-4BCD-93E2-E3B085C9AB24}">
+                <p16:designElem xmlns:p16="http://schemas.microsoft.com/office/powerpoint/2015/main" val="1"/>
+              </p:ext>
+            </p:extLst>
+          </p:nvPr>
+        </p:nvCxnSpPr>
+        <p:spPr>
+          <a:xfrm>
+            <a:off x="4654296" y="2057400"/>
+            <a:ext cx="0" cy="2743200"/>
+          </a:xfrm>
+          <a:prstGeom prst="line">
+            <a:avLst/>
+          </a:prstGeom>
+          <a:ln w="19050">
+            <a:solidFill>
+              <a:schemeClr val="tx1">
+                <a:lumMod val="85000"/>
+                <a:lumOff val="15000"/>
+              </a:schemeClr>
+            </a:solidFill>
+          </a:ln>
+        </p:spPr>
+        <p:style>
+          <a:lnRef idx="1">
+            <a:schemeClr val="accent1"/>
+          </a:lnRef>
+          <a:fillRef idx="0">
+            <a:schemeClr val="accent1"/>
+          </a:fillRef>
+          <a:effectRef idx="0">
+            <a:schemeClr val="accent1"/>
+          </a:effectRef>
+          <a:fontRef idx="minor">
+            <a:schemeClr val="tx1"/>
+          </a:fontRef>
+        </p:style>
+      </p:cxnSp>
+      <p:sp>
+        <p:nvSpPr>
+          <p:cNvPr id="3" name="Content Placeholder 2">
+            <a:extLst>
+              <a:ext uri="{FF2B5EF4-FFF2-40B4-BE49-F238E27FC236}">
+                <a16:creationId xmlns:a16="http://schemas.microsoft.com/office/drawing/2014/main" id="{FF6AF418-8710-4CF6-B2D6-474235BB399C}"/>
+              </a:ext>
+            </a:extLst>
+          </p:cNvPr>
+          <p:cNvSpPr>
+            <a:spLocks noGrp="1"/>
+          </p:cNvSpPr>
+          <p:nvPr>
+            <p:ph idx="1"/>
+          </p:nvPr>
+        </p:nvSpPr>
+        <p:spPr>
+          <a:xfrm>
+            <a:off x="4976031" y="963877"/>
+            <a:ext cx="6377769" cy="4930246"/>
+          </a:xfrm>
+        </p:spPr>
+        <p:txBody>
+          <a:bodyPr anchor="ctr">
+            <a:normAutofit/>
+          </a:bodyPr>
+          <a:lstStyle/>
+          <a:p>
+            <a:r>
+              <a:rPr lang="de-CH" dirty="0"/>
+              <a:t>To </a:t>
+            </a:r>
+            <a:r>
+              <a:rPr lang="de-CH" dirty="0" err="1"/>
+              <a:t>learn</a:t>
+            </a:r>
+            <a:r>
+              <a:rPr lang="de-CH" dirty="0"/>
+              <a:t> how to </a:t>
+            </a:r>
+            <a:r>
+              <a:rPr lang="de-CH" dirty="0" err="1"/>
+              <a:t>create</a:t>
+            </a:r>
+            <a:r>
+              <a:rPr lang="de-CH" dirty="0"/>
+              <a:t> a </a:t>
+            </a:r>
+            <a:r>
+              <a:rPr lang="de-CH" dirty="0" err="1"/>
+              <a:t>bug</a:t>
+            </a:r>
+            <a:r>
+              <a:rPr lang="de-CH" dirty="0"/>
+              <a:t> in </a:t>
+            </a:r>
+            <a:r>
+              <a:rPr lang="de-CH" dirty="0" err="1"/>
+              <a:t>github</a:t>
+            </a:r>
+            <a:r>
+              <a:rPr lang="de-CH" dirty="0"/>
+              <a:t> you </a:t>
+            </a:r>
+            <a:r>
+              <a:rPr lang="de-CH" dirty="0" err="1"/>
+              <a:t>can</a:t>
+            </a:r>
+            <a:r>
+              <a:rPr lang="de-CH" dirty="0"/>
+              <a:t> follow </a:t>
+            </a:r>
+            <a:r>
+              <a:rPr lang="de-CH" dirty="0" err="1"/>
+              <a:t>this</a:t>
+            </a:r>
+            <a:r>
+              <a:rPr lang="de-CH" dirty="0"/>
+              <a:t> easy </a:t>
+            </a:r>
+            <a:r>
+              <a:rPr lang="de-CH" dirty="0" err="1"/>
+              <a:t>guide</a:t>
+            </a:r>
+            <a:r>
+              <a:rPr lang="de-CH" dirty="0"/>
+              <a:t> from </a:t>
+            </a:r>
+            <a:r>
+              <a:rPr lang="de-CH" dirty="0" err="1"/>
+              <a:t>github</a:t>
+            </a:r>
+            <a:endParaRPr lang="de-CH" dirty="0"/>
+          </a:p>
+          <a:p>
+            <a:pPr marL="0" indent="0" algn="ctr">
+              <a:buNone/>
+            </a:pPr>
+            <a:r>
+              <a:rPr lang="en-GB" dirty="0">
+                <a:hlinkClick r:id="rId2"/>
+              </a:rPr>
+              <a:t>https://help.github.com/articles/creating-an-issue/</a:t>
+            </a:r>
+            <a:endParaRPr lang="en-GB" dirty="0"/>
+          </a:p>
+          <a:p>
+            <a:pPr marL="0" indent="0" algn="ctr">
+              <a:buNone/>
+            </a:pPr>
+            <a:r>
+              <a:rPr lang="en-GB" dirty="0"/>
+              <a:t>(or if you want to type </a:t>
+            </a:r>
+            <a:r>
+              <a:rPr lang="en-GB" dirty="0">
+                <a:hlinkClick r:id="rId3"/>
+              </a:rPr>
+              <a:t>https://goo.gl/294qg4</a:t>
+            </a:r>
+            <a:r>
+              <a:rPr lang="en-GB" dirty="0"/>
+              <a:t>) </a:t>
+            </a:r>
+            <a:endParaRPr lang="de-CH" dirty="0"/>
+          </a:p>
+          <a:p>
+            <a:pPr marL="0" indent="0">
+              <a:buNone/>
+            </a:pPr>
+            <a:endParaRPr lang="en-GB" dirty="0"/>
+          </a:p>
+        </p:txBody>
+      </p:sp>
+    </p:spTree>
+    <p:extLst>
+      <p:ext uri="{BB962C8B-B14F-4D97-AF65-F5344CB8AC3E}">
+        <p14:creationId xmlns:p14="http://schemas.microsoft.com/office/powerpoint/2010/main" val="2691658650"/>
+      </p:ext>
+    </p:extLst>
+  </p:cSld>
+  <p:clrMapOvr>
+    <a:masterClrMapping/>
+  </p:clrMapOvr>
+</p:sld>
+</file>
+
+<file path=ppt/slides/slide11.xml><?xml version="1.0" encoding="utf-8"?>
 <p:sld xmlns:a="http://schemas.openxmlformats.org/drawingml/2006/main" xmlns:r="http://schemas.openxmlformats.org/officeDocument/2006/relationships" xmlns:p="http://schemas.openxmlformats.org/presentationml/2006/main">
   <p:cSld>
     <p:bg>
@@ -4651,7 +5034,7 @@
           <p:cNvPr id="2" name="Title 1">
             <a:extLst>
               <a:ext uri="{FF2B5EF4-FFF2-40B4-BE49-F238E27FC236}">
-                <a16:creationId xmlns:a16="http://schemas.microsoft.com/office/drawing/2014/main" id="{1161174F-76FD-4B60-8A30-76467EC42E76}"/>
+                <a16:creationId xmlns:a16="http://schemas.microsoft.com/office/drawing/2014/main" id="{4D88C07D-5F53-4192-81AB-DD60212B4B5C}"/>
               </a:ext>
             </a:extLst>
           </p:cNvPr>
@@ -4676,14 +5059,14 @@
           <a:p>
             <a:pPr algn="r"/>
             <a:r>
-              <a:rPr lang="de-CH" sz="5400" dirty="0" err="1">
+              <a:rPr lang="de-CH">
                 <a:solidFill>
                   <a:schemeClr val="accent1"/>
                 </a:solidFill>
               </a:rPr>
-              <a:t>github</a:t>
-            </a:r>
-            <a:endParaRPr lang="en-CH" sz="5400" dirty="0">
+              <a:t>Which Tools / Technologies are we using in this course?</a:t>
+            </a:r>
+            <a:endParaRPr lang="en-CH">
               <a:solidFill>
                 <a:schemeClr val="accent1"/>
               </a:solidFill>
@@ -4751,7 +5134,7 @@
           <p:cNvPr id="3" name="Content Placeholder 2">
             <a:extLst>
               <a:ext uri="{FF2B5EF4-FFF2-40B4-BE49-F238E27FC236}">
-                <a16:creationId xmlns:a16="http://schemas.microsoft.com/office/drawing/2014/main" id="{67CB4536-0B83-4B37-ACFA-0A0E9AE09E67}"/>
+                <a16:creationId xmlns:a16="http://schemas.microsoft.com/office/drawing/2014/main" id="{CD638004-E15C-4F5B-BCB4-DDBFD0FDF463}"/>
               </a:ext>
             </a:extLst>
           </p:cNvPr>
@@ -4770,185 +5153,274 @@
         </p:spPr>
         <p:txBody>
           <a:bodyPr anchor="ctr">
-            <a:normAutofit lnSpcReduction="10000"/>
+            <a:normAutofit/>
           </a:bodyPr>
           <a:lstStyle/>
           <a:p>
             <a:r>
-              <a:rPr lang="de-CH" dirty="0"/>
-              <a:t>You will find </a:t>
+              <a:rPr lang="de-CH" sz="2400" dirty="0"/>
+              <a:t>In </a:t>
+            </a:r>
+            <a:r>
+              <a:rPr lang="de-CH" sz="2400" dirty="0" err="1"/>
+              <a:t>this</a:t>
+            </a:r>
+            <a:r>
+              <a:rPr lang="de-CH" sz="2400" dirty="0"/>
+              <a:t> </a:t>
+            </a:r>
+            <a:r>
+              <a:rPr lang="de-CH" sz="2400" dirty="0" err="1"/>
+              <a:t>course</a:t>
+            </a:r>
+            <a:r>
+              <a:rPr lang="de-CH" sz="2400" dirty="0"/>
+              <a:t> </a:t>
+            </a:r>
+            <a:r>
+              <a:rPr lang="de-CH" sz="2400" dirty="0" err="1"/>
+              <a:t>we</a:t>
+            </a:r>
+            <a:r>
+              <a:rPr lang="de-CH" sz="2400" dirty="0"/>
+              <a:t> will </a:t>
+            </a:r>
+            <a:r>
+              <a:rPr lang="de-CH" sz="2400" dirty="0" err="1"/>
+              <a:t>use</a:t>
+            </a:r>
+            <a:r>
+              <a:rPr lang="de-CH" sz="2400" dirty="0"/>
+              <a:t>:</a:t>
+            </a:r>
+          </a:p>
+          <a:p>
+            <a:pPr lvl="1"/>
+            <a:r>
+              <a:rPr lang="de-CH" dirty="0"/>
+              <a:t>Files </a:t>
             </a:r>
             <a:r>
               <a:rPr lang="de-CH" dirty="0" err="1"/>
-              <a:t>everything</a:t>
-            </a:r>
-            <a:r>
-              <a:rPr lang="de-CH" dirty="0"/>
-              <a:t> on </a:t>
+              <a:t>management</a:t>
+            </a:r>
+            <a:r>
+              <a:rPr lang="de-CH" dirty="0"/>
+              <a:t> </a:t>
             </a:r>
             <a:r>
               <a:rPr lang="de-CH" dirty="0" err="1"/>
-              <a:t>github</a:t>
-            </a:r>
-            <a:r>
-              <a:rPr lang="de-CH" dirty="0"/>
-              <a:t> at </a:t>
-            </a:r>
+              <a:t>system</a:t>
+            </a:r>
+            <a:r>
+              <a:rPr lang="de-CH" dirty="0"/>
+              <a:t>: </a:t>
+            </a:r>
+            <a:r>
+              <a:rPr lang="de-CH" dirty="0">
+                <a:hlinkClick r:id="rId2" action="ppaction://hlinkfile"/>
+              </a:rPr>
+              <a:t>github.com</a:t>
+            </a:r>
+            <a:endParaRPr lang="de-CH" dirty="0"/>
+          </a:p>
+          <a:p>
+            <a:pPr lvl="1"/>
             <a:r>
               <a:rPr lang="de-CH" dirty="0" err="1"/>
-              <a:t>this</a:t>
-            </a:r>
-            <a:r>
-              <a:rPr lang="de-CH" dirty="0"/>
-              <a:t> link</a:t>
-            </a:r>
-          </a:p>
-          <a:p>
-            <a:pPr marL="0" indent="0">
+              <a:t>Programming</a:t>
+            </a:r>
+            <a:r>
+              <a:rPr lang="de-CH" dirty="0"/>
+              <a:t> </a:t>
+            </a:r>
+            <a:r>
+              <a:rPr lang="de-CH" dirty="0" err="1"/>
+              <a:t>language</a:t>
+            </a:r>
+            <a:r>
+              <a:rPr lang="de-CH" dirty="0"/>
+              <a:t>: </a:t>
+            </a:r>
+            <a:r>
+              <a:rPr lang="de-CH" dirty="0" err="1"/>
+              <a:t>python</a:t>
+            </a:r>
+            <a:r>
+              <a:rPr lang="de-CH" dirty="0"/>
+              <a:t> (</a:t>
+            </a:r>
+            <a:r>
+              <a:rPr lang="de-CH" dirty="0" err="1"/>
+              <a:t>anaconda</a:t>
+            </a:r>
+            <a:r>
+              <a:rPr lang="de-CH" dirty="0"/>
+              <a:t> </a:t>
+            </a:r>
+            <a:r>
+              <a:rPr lang="de-CH" dirty="0" err="1"/>
+              <a:t>distribution</a:t>
+            </a:r>
+            <a:r>
+              <a:rPr lang="de-CH"/>
+              <a:t>)</a:t>
+            </a:r>
+            <a:endParaRPr lang="de-CH" dirty="0"/>
+          </a:p>
+          <a:p>
+            <a:pPr lvl="1"/>
+            <a:r>
+              <a:rPr lang="de-CH" dirty="0"/>
+              <a:t>Development </a:t>
+            </a:r>
+            <a:r>
+              <a:rPr lang="de-CH" dirty="0" err="1"/>
+              <a:t>environment</a:t>
+            </a:r>
+            <a:r>
+              <a:rPr lang="de-CH" dirty="0"/>
+              <a:t>: </a:t>
+            </a:r>
+            <a:r>
+              <a:rPr lang="de-CH" dirty="0" err="1"/>
+              <a:t>Jupyter</a:t>
+            </a:r>
+            <a:r>
+              <a:rPr lang="de-CH" dirty="0"/>
+              <a:t> </a:t>
+            </a:r>
+            <a:r>
+              <a:rPr lang="de-CH" dirty="0" err="1"/>
+              <a:t>notebooks</a:t>
+            </a:r>
+            <a:endParaRPr lang="de-CH" dirty="0"/>
+          </a:p>
+          <a:p>
+            <a:pPr lvl="1"/>
+            <a:r>
+              <a:rPr lang="de-CH" dirty="0"/>
+              <a:t>Python </a:t>
+            </a:r>
+            <a:r>
+              <a:rPr lang="de-CH" dirty="0" err="1"/>
+              <a:t>packages</a:t>
+            </a:r>
+            <a:r>
+              <a:rPr lang="de-CH" dirty="0"/>
+              <a:t>: numpy / matplotlib / (less </a:t>
+            </a:r>
+            <a:r>
+              <a:rPr lang="de-CH" dirty="0" err="1"/>
+              <a:t>frequently</a:t>
+            </a:r>
+            <a:r>
+              <a:rPr lang="de-CH" dirty="0"/>
+              <a:t>) </a:t>
+            </a:r>
+            <a:r>
+              <a:rPr lang="de-CH" dirty="0" err="1"/>
+              <a:t>pandas</a:t>
+            </a:r>
+            <a:endParaRPr lang="de-CH" dirty="0"/>
+          </a:p>
+          <a:p>
+            <a:pPr lvl="1"/>
+            <a:r>
+              <a:rPr lang="de-CH" dirty="0"/>
+              <a:t>Python </a:t>
+            </a:r>
+            <a:r>
+              <a:rPr lang="de-CH" dirty="0" err="1"/>
+              <a:t>deep</a:t>
+            </a:r>
+            <a:r>
+              <a:rPr lang="de-CH" dirty="0"/>
+              <a:t> </a:t>
+            </a:r>
+            <a:r>
+              <a:rPr lang="de-CH" dirty="0" err="1"/>
+              <a:t>learning</a:t>
+            </a:r>
+            <a:r>
+              <a:rPr lang="de-CH" dirty="0"/>
+              <a:t> </a:t>
+            </a:r>
+            <a:r>
+              <a:rPr lang="de-CH" dirty="0" err="1"/>
+              <a:t>package</a:t>
+            </a:r>
+            <a:r>
+              <a:rPr lang="de-CH" dirty="0"/>
+              <a:t>: tensorflow</a:t>
+            </a:r>
+          </a:p>
+          <a:p>
+            <a:pPr marL="457200" lvl="1" indent="0">
               <a:buNone/>
             </a:pPr>
             <a:endParaRPr lang="de-CH" dirty="0"/>
           </a:p>
           <a:p>
-            <a:pPr marL="0" indent="0" algn="ctr">
-              <a:buNone/>
-            </a:pPr>
-            <a:r>
-              <a:rPr lang="de-CH" dirty="0">
-                <a:hlinkClick r:id="rId2"/>
-              </a:rPr>
-              <a:t>https://github.com/michelucci/dlcourse2018_students</a:t>
-            </a:r>
-            <a:r>
-              <a:rPr lang="de-CH" dirty="0"/>
+            <a:r>
+              <a:rPr lang="de-CH" sz="2400" dirty="0"/>
+              <a:t>Each </a:t>
+            </a:r>
+            <a:r>
+              <a:rPr lang="de-CH" sz="2400" dirty="0" err="1"/>
+              <a:t>need</a:t>
+            </a:r>
+            <a:r>
+              <a:rPr lang="de-CH" sz="2400" dirty="0"/>
+              <a:t> to </a:t>
+            </a:r>
+            <a:r>
+              <a:rPr lang="de-CH" sz="2400" dirty="0" err="1"/>
+              <a:t>use</a:t>
+            </a:r>
+            <a:r>
+              <a:rPr lang="de-CH" sz="2400" dirty="0"/>
               <a:t> </a:t>
             </a:r>
-          </a:p>
-          <a:p>
-            <a:pPr marL="0" indent="0" algn="ctr">
-              <a:buNone/>
-            </a:pPr>
-            <a:r>
-              <a:rPr lang="de-CH" dirty="0"/>
-              <a:t>(or if you </a:t>
-            </a:r>
-            <a:r>
-              <a:rPr lang="de-CH" dirty="0" err="1"/>
-              <a:t>want</a:t>
-            </a:r>
-            <a:r>
-              <a:rPr lang="de-CH" dirty="0"/>
-              <a:t> to type </a:t>
-            </a:r>
-            <a:r>
-              <a:rPr lang="de-CH" dirty="0" err="1"/>
-              <a:t>it</a:t>
-            </a:r>
-            <a:r>
-              <a:rPr lang="de-CH" dirty="0"/>
-              <a:t> </a:t>
-            </a:r>
-            <a:r>
-              <a:rPr lang="de-CH" dirty="0">
-                <a:hlinkClick r:id="rId3"/>
-              </a:rPr>
-              <a:t>https://goo.gl/CgDbUH</a:t>
-            </a:r>
-            <a:r>
-              <a:rPr lang="de-CH" dirty="0"/>
-              <a:t>) </a:t>
-            </a:r>
-          </a:p>
-          <a:p>
-            <a:pPr marL="0" indent="0">
-              <a:buNone/>
-            </a:pPr>
-            <a:endParaRPr lang="de-CH" dirty="0"/>
-          </a:p>
-          <a:p>
-            <a:r>
-              <a:rPr lang="de-CH" dirty="0"/>
-              <a:t>On </a:t>
-            </a:r>
-            <a:r>
-              <a:rPr lang="de-CH" dirty="0" err="1"/>
-              <a:t>github</a:t>
-            </a:r>
-            <a:r>
-              <a:rPr lang="de-CH" dirty="0"/>
-              <a:t> you will find all power </a:t>
-            </a:r>
-            <a:r>
-              <a:rPr lang="de-CH" dirty="0" err="1"/>
-              <a:t>presentations</a:t>
-            </a:r>
-            <a:r>
-              <a:rPr lang="de-CH" dirty="0"/>
-              <a:t>, all </a:t>
-            </a:r>
-            <a:r>
-              <a:rPr lang="de-CH" dirty="0" err="1"/>
-              <a:t>jupyter</a:t>
-            </a:r>
-            <a:r>
-              <a:rPr lang="de-CH" dirty="0"/>
-              <a:t> </a:t>
-            </a:r>
-            <a:r>
-              <a:rPr lang="de-CH" dirty="0" err="1"/>
-              <a:t>notebooks</a:t>
-            </a:r>
-            <a:r>
-              <a:rPr lang="de-CH" dirty="0"/>
-              <a:t> and all </a:t>
-            </a:r>
-            <a:r>
-              <a:rPr lang="de-CH" dirty="0" err="1"/>
-              <a:t>datasets</a:t>
-            </a:r>
-            <a:r>
-              <a:rPr lang="de-CH" dirty="0"/>
-              <a:t> that </a:t>
-            </a:r>
-            <a:r>
-              <a:rPr lang="de-CH" dirty="0" err="1"/>
-              <a:t>we</a:t>
-            </a:r>
-            <a:r>
-              <a:rPr lang="de-CH" dirty="0"/>
+            <a:r>
+              <a:rPr lang="de-CH" sz="2400" dirty="0" err="1"/>
+              <a:t>his</a:t>
+            </a:r>
+            <a:r>
+              <a:rPr lang="de-CH" sz="2400" dirty="0"/>
+              <a:t>/her own </a:t>
+            </a:r>
+            <a:r>
+              <a:rPr lang="de-CH" sz="2400" dirty="0" err="1"/>
+              <a:t>laptop</a:t>
+            </a:r>
+            <a:r>
+              <a:rPr lang="de-CH" sz="2400" dirty="0"/>
+              <a:t> (</a:t>
+            </a:r>
+            <a:r>
+              <a:rPr lang="de-CH" sz="2400" dirty="0" err="1"/>
+              <a:t>windows</a:t>
+            </a:r>
+            <a:r>
+              <a:rPr lang="de-CH" sz="2400" dirty="0"/>
+              <a:t> or </a:t>
+            </a:r>
+            <a:r>
+              <a:rPr lang="de-CH" sz="2400" dirty="0" err="1"/>
+              <a:t>mac</a:t>
+            </a:r>
+            <a:r>
+              <a:rPr lang="de-CH" sz="2400" dirty="0"/>
               <a:t> will </a:t>
             </a:r>
             <a:r>
-              <a:rPr lang="de-CH" dirty="0" err="1"/>
-              <a:t>use</a:t>
-            </a:r>
-            <a:r>
-              <a:rPr lang="de-CH" dirty="0"/>
-              <a:t> </a:t>
-            </a:r>
-            <a:r>
-              <a:rPr lang="de-CH" dirty="0" err="1"/>
-              <a:t>during</a:t>
-            </a:r>
-            <a:r>
-              <a:rPr lang="de-CH" dirty="0"/>
-              <a:t> </a:t>
-            </a:r>
-            <a:r>
-              <a:rPr lang="de-CH" dirty="0" err="1"/>
-              <a:t>this</a:t>
-            </a:r>
-            <a:r>
-              <a:rPr lang="de-CH" dirty="0"/>
-              <a:t> </a:t>
-            </a:r>
-            <a:r>
-              <a:rPr lang="de-CH" dirty="0" err="1"/>
-              <a:t>course</a:t>
-            </a:r>
-            <a:r>
-              <a:rPr lang="de-CH" dirty="0"/>
-              <a:t>.</a:t>
+              <a:rPr lang="de-CH" sz="2400" dirty="0" err="1"/>
+              <a:t>work</a:t>
+            </a:r>
+            <a:r>
+              <a:rPr lang="de-CH" sz="2400" dirty="0"/>
+              <a:t>)</a:t>
             </a:r>
           </a:p>
         </p:txBody>
@@ -4956,7 +5428,7 @@
     </p:spTree>
     <p:extLst>
       <p:ext uri="{BB962C8B-B14F-4D97-AF65-F5344CB8AC3E}">
-        <p14:creationId xmlns:p14="http://schemas.microsoft.com/office/powerpoint/2010/main" val="1036947648"/>
+        <p14:creationId xmlns:p14="http://schemas.microsoft.com/office/powerpoint/2010/main" val="1184672501"/>
       </p:ext>
     </p:extLst>
   </p:cSld>
@@ -4967,552 +5439,6 @@
 </file>
 
 <file path=ppt/slides/slide8.xml><?xml version="1.0" encoding="utf-8"?>
-<p:sld xmlns:a="http://schemas.openxmlformats.org/drawingml/2006/main" xmlns:r="http://schemas.openxmlformats.org/officeDocument/2006/relationships" xmlns:p="http://schemas.openxmlformats.org/presentationml/2006/main">
-  <p:cSld>
-    <p:bg>
-      <p:bgPr>
-        <a:solidFill>
-          <a:schemeClr val="bg1">
-            <a:lumMod val="95000"/>
-          </a:schemeClr>
-        </a:solidFill>
-        <a:effectLst/>
-      </p:bgPr>
-    </p:bg>
-    <p:spTree>
-      <p:nvGrpSpPr>
-        <p:cNvPr id="1" name=""/>
-        <p:cNvGrpSpPr/>
-        <p:nvPr/>
-      </p:nvGrpSpPr>
-      <p:grpSpPr>
-        <a:xfrm>
-          <a:off x="0" y="0"/>
-          <a:ext cx="0" cy="0"/>
-          <a:chOff x="0" y="0"/>
-          <a:chExt cx="0" cy="0"/>
-        </a:xfrm>
-      </p:grpSpPr>
-      <p:sp>
-        <p:nvSpPr>
-          <p:cNvPr id="2" name="Title 1">
-            <a:extLst>
-              <a:ext uri="{FF2B5EF4-FFF2-40B4-BE49-F238E27FC236}">
-                <a16:creationId xmlns:a16="http://schemas.microsoft.com/office/drawing/2014/main" id="{72E4DA06-D887-4823-8E43-88EE71716BCE}"/>
-              </a:ext>
-            </a:extLst>
-          </p:cNvPr>
-          <p:cNvSpPr>
-            <a:spLocks noGrp="1"/>
-          </p:cNvSpPr>
-          <p:nvPr>
-            <p:ph type="title"/>
-          </p:nvPr>
-        </p:nvSpPr>
-        <p:spPr>
-          <a:xfrm>
-            <a:off x="643470" y="648269"/>
-            <a:ext cx="3614631" cy="5244531"/>
-          </a:xfrm>
-          <a:solidFill>
-            <a:schemeClr val="bg1">
-              <a:alpha val="70000"/>
-            </a:schemeClr>
-          </a:solidFill>
-          <a:ln w="31750" cap="sq">
-            <a:solidFill>
-              <a:schemeClr val="tx1">
-                <a:lumMod val="75000"/>
-                <a:lumOff val="25000"/>
-              </a:schemeClr>
-            </a:solidFill>
-            <a:miter lim="800000"/>
-          </a:ln>
-        </p:spPr>
-        <p:txBody>
-          <a:bodyPr>
-            <a:normAutofit/>
-          </a:bodyPr>
-          <a:lstStyle/>
-          <a:p>
-            <a:pPr algn="ctr"/>
-            <a:r>
-              <a:rPr lang="de-CH" sz="4000">
-                <a:solidFill>
-                  <a:schemeClr val="tx1">
-                    <a:lumMod val="85000"/>
-                    <a:lumOff val="15000"/>
-                  </a:schemeClr>
-                </a:solidFill>
-              </a:rPr>
-              <a:t>How to send me errors and requests</a:t>
-            </a:r>
-            <a:endParaRPr lang="en-CH" sz="4000">
-              <a:solidFill>
-                <a:schemeClr val="tx1">
-                  <a:lumMod val="85000"/>
-                  <a:lumOff val="15000"/>
-                </a:schemeClr>
-              </a:solidFill>
-            </a:endParaRPr>
-          </a:p>
-        </p:txBody>
-      </p:sp>
-      <p:sp>
-        <p:nvSpPr>
-          <p:cNvPr id="3" name="Content Placeholder 2">
-            <a:extLst>
-              <a:ext uri="{FF2B5EF4-FFF2-40B4-BE49-F238E27FC236}">
-                <a16:creationId xmlns:a16="http://schemas.microsoft.com/office/drawing/2014/main" id="{93C3B092-80CD-4E0F-8AEF-5320A7174ABB}"/>
-              </a:ext>
-            </a:extLst>
-          </p:cNvPr>
-          <p:cNvSpPr>
-            <a:spLocks noGrp="1"/>
-          </p:cNvSpPr>
-          <p:nvPr>
-            <p:ph idx="1"/>
-          </p:nvPr>
-        </p:nvSpPr>
-        <p:spPr>
-          <a:xfrm>
-            <a:off x="4672101" y="648269"/>
-            <a:ext cx="6876429" cy="2649877"/>
-          </a:xfrm>
-        </p:spPr>
-        <p:txBody>
-          <a:bodyPr>
-            <a:normAutofit lnSpcReduction="10000"/>
-          </a:bodyPr>
-          <a:lstStyle/>
-          <a:p>
-            <a:pPr marL="0" indent="0">
-              <a:buNone/>
-            </a:pPr>
-            <a:r>
-              <a:rPr lang="de-CH" sz="2400" dirty="0"/>
-              <a:t>I am not </a:t>
-            </a:r>
-            <a:r>
-              <a:rPr lang="de-CH" sz="2400" dirty="0" err="1"/>
-              <a:t>perfect</a:t>
-            </a:r>
-            <a:r>
-              <a:rPr lang="de-CH" sz="2400" dirty="0"/>
-              <a:t> so </a:t>
-            </a:r>
-            <a:r>
-              <a:rPr lang="de-CH" sz="2400" dirty="0" err="1"/>
-              <a:t>the</a:t>
-            </a:r>
-            <a:r>
-              <a:rPr lang="de-CH" sz="2400" dirty="0"/>
-              <a:t> </a:t>
-            </a:r>
-            <a:r>
-              <a:rPr lang="de-CH" sz="2400" dirty="0" err="1"/>
-              <a:t>probability</a:t>
-            </a:r>
-            <a:r>
-              <a:rPr lang="de-CH" sz="2400" dirty="0"/>
-              <a:t> that you will find </a:t>
-            </a:r>
-            <a:r>
-              <a:rPr lang="de-CH" sz="2400" dirty="0" err="1"/>
-              <a:t>errors</a:t>
-            </a:r>
-            <a:r>
-              <a:rPr lang="de-CH" sz="2400" dirty="0"/>
-              <a:t> in </a:t>
-            </a:r>
-            <a:r>
-              <a:rPr lang="de-CH" sz="2400" dirty="0" err="1"/>
-              <a:t>the</a:t>
-            </a:r>
-            <a:r>
-              <a:rPr lang="de-CH" sz="2400" dirty="0"/>
-              <a:t> </a:t>
-            </a:r>
-            <a:r>
-              <a:rPr lang="de-CH" sz="2400" dirty="0" err="1"/>
-              <a:t>powerpoint</a:t>
-            </a:r>
-            <a:r>
-              <a:rPr lang="de-CH" sz="2400" dirty="0"/>
-              <a:t> </a:t>
-            </a:r>
-            <a:r>
-              <a:rPr lang="de-CH" sz="2400" dirty="0" err="1"/>
-              <a:t>presentations</a:t>
-            </a:r>
-            <a:r>
-              <a:rPr lang="de-CH" sz="2400" dirty="0"/>
-              <a:t> or (</a:t>
-            </a:r>
-            <a:r>
-              <a:rPr lang="de-CH" sz="2400" dirty="0" err="1"/>
-              <a:t>especially</a:t>
-            </a:r>
-            <a:r>
-              <a:rPr lang="de-CH" sz="2400" dirty="0"/>
-              <a:t>) in </a:t>
-            </a:r>
-            <a:r>
-              <a:rPr lang="de-CH" sz="2400" dirty="0" err="1"/>
-              <a:t>the</a:t>
-            </a:r>
-            <a:r>
-              <a:rPr lang="de-CH" sz="2400" dirty="0"/>
-              <a:t> </a:t>
-            </a:r>
-            <a:r>
-              <a:rPr lang="de-CH" sz="2400" dirty="0" err="1"/>
-              <a:t>code</a:t>
-            </a:r>
-            <a:r>
-              <a:rPr lang="de-CH" sz="2400" dirty="0"/>
-              <a:t> </a:t>
-            </a:r>
-            <a:r>
-              <a:rPr lang="de-CH" sz="2400" dirty="0" err="1"/>
-              <a:t>exampels</a:t>
-            </a:r>
-            <a:r>
-              <a:rPr lang="de-CH" sz="2400" dirty="0"/>
-              <a:t> (</a:t>
-            </a:r>
-            <a:r>
-              <a:rPr lang="de-CH" sz="2400" dirty="0" err="1"/>
-              <a:t>the</a:t>
-            </a:r>
-            <a:r>
-              <a:rPr lang="de-CH" sz="2400" dirty="0"/>
-              <a:t> </a:t>
-            </a:r>
-            <a:r>
-              <a:rPr lang="de-CH" sz="2400" dirty="0" err="1"/>
-              <a:t>jupyter</a:t>
-            </a:r>
-            <a:r>
-              <a:rPr lang="de-CH" sz="2400" dirty="0"/>
-              <a:t> </a:t>
-            </a:r>
-            <a:r>
-              <a:rPr lang="de-CH" sz="2400" dirty="0" err="1"/>
-              <a:t>notebooks</a:t>
-            </a:r>
-            <a:r>
-              <a:rPr lang="de-CH" sz="2400" dirty="0"/>
-              <a:t>) is not </a:t>
-            </a:r>
-            <a:r>
-              <a:rPr lang="de-CH" sz="2400" dirty="0" err="1"/>
-              <a:t>zero</a:t>
-            </a:r>
-            <a:r>
-              <a:rPr lang="de-CH" sz="2400" dirty="0"/>
-              <a:t>. In </a:t>
-            </a:r>
-            <a:r>
-              <a:rPr lang="de-CH" sz="2400" dirty="0" err="1"/>
-              <a:t>case</a:t>
-            </a:r>
-            <a:r>
-              <a:rPr lang="de-CH" sz="2400" dirty="0"/>
-              <a:t> you do, </a:t>
-            </a:r>
-            <a:r>
-              <a:rPr lang="de-CH" sz="2400" dirty="0" err="1"/>
-              <a:t>please</a:t>
-            </a:r>
-            <a:r>
-              <a:rPr lang="de-CH" sz="2400" dirty="0"/>
-              <a:t> send </a:t>
-            </a:r>
-            <a:r>
-              <a:rPr lang="de-CH" sz="2400" dirty="0" err="1"/>
-              <a:t>me</a:t>
-            </a:r>
-            <a:r>
-              <a:rPr lang="de-CH" sz="2400" dirty="0"/>
-              <a:t> </a:t>
-            </a:r>
-            <a:r>
-              <a:rPr lang="de-CH" sz="2400" dirty="0" err="1"/>
-              <a:t>the</a:t>
-            </a:r>
-            <a:r>
-              <a:rPr lang="de-CH" sz="2400" dirty="0"/>
-              <a:t> </a:t>
-            </a:r>
-            <a:r>
-              <a:rPr lang="de-CH" sz="2400" dirty="0" err="1"/>
-              <a:t>bugs</a:t>
-            </a:r>
-            <a:r>
-              <a:rPr lang="de-CH" sz="2400" dirty="0"/>
-              <a:t>. To make </a:t>
-            </a:r>
-            <a:r>
-              <a:rPr lang="de-CH" sz="2400" dirty="0" err="1"/>
-              <a:t>the</a:t>
-            </a:r>
-            <a:r>
-              <a:rPr lang="de-CH" sz="2400" dirty="0"/>
-              <a:t> </a:t>
-            </a:r>
-            <a:r>
-              <a:rPr lang="de-CH" sz="2400" dirty="0" err="1"/>
-              <a:t>bugs</a:t>
-            </a:r>
-            <a:r>
-              <a:rPr lang="de-CH" sz="2400" dirty="0"/>
-              <a:t> </a:t>
-            </a:r>
-            <a:r>
-              <a:rPr lang="de-CH" sz="2400" dirty="0" err="1"/>
-              <a:t>easier</a:t>
-            </a:r>
-            <a:r>
-              <a:rPr lang="de-CH" sz="2400" dirty="0"/>
-              <a:t> to correct (for </a:t>
-            </a:r>
-            <a:r>
-              <a:rPr lang="de-CH" sz="2400" dirty="0" err="1"/>
-              <a:t>me</a:t>
-            </a:r>
-            <a:r>
-              <a:rPr lang="de-CH" sz="2400" dirty="0"/>
-              <a:t>) and </a:t>
-            </a:r>
-            <a:r>
-              <a:rPr lang="de-CH" sz="2400" dirty="0" err="1"/>
-              <a:t>easier</a:t>
-            </a:r>
-            <a:r>
-              <a:rPr lang="de-CH" sz="2400" dirty="0"/>
-              <a:t> to check (for you) </a:t>
-            </a:r>
-            <a:r>
-              <a:rPr lang="de-CH" sz="2400" dirty="0" err="1"/>
-              <a:t>please</a:t>
-            </a:r>
-            <a:r>
-              <a:rPr lang="de-CH" sz="2400" dirty="0"/>
-              <a:t> </a:t>
-            </a:r>
-            <a:r>
-              <a:rPr lang="de-CH" sz="2400" dirty="0" err="1"/>
-              <a:t>use</a:t>
-            </a:r>
-            <a:r>
-              <a:rPr lang="de-CH" sz="2400" dirty="0"/>
-              <a:t> </a:t>
-            </a:r>
-            <a:r>
-              <a:rPr lang="de-CH" sz="2400" dirty="0" err="1"/>
-              <a:t>the</a:t>
-            </a:r>
-            <a:r>
-              <a:rPr lang="de-CH" sz="2400" dirty="0"/>
-              <a:t> </a:t>
-            </a:r>
-            <a:r>
-              <a:rPr lang="de-CH" sz="2400" b="1" dirty="0"/>
-              <a:t>«New </a:t>
-            </a:r>
-            <a:r>
-              <a:rPr lang="de-CH" sz="2400" b="1" dirty="0" err="1"/>
-              <a:t>Issue</a:t>
-            </a:r>
-            <a:r>
-              <a:rPr lang="de-CH" sz="2400" b="1" dirty="0"/>
-              <a:t>» </a:t>
-            </a:r>
-            <a:r>
-              <a:rPr lang="de-CH" sz="2400" dirty="0" err="1"/>
-              <a:t>functionality</a:t>
-            </a:r>
-            <a:r>
-              <a:rPr lang="de-CH" sz="2400" dirty="0"/>
-              <a:t> in </a:t>
-            </a:r>
-            <a:r>
-              <a:rPr lang="de-CH" sz="2400" dirty="0" err="1"/>
-              <a:t>github</a:t>
-            </a:r>
-            <a:r>
-              <a:rPr lang="de-CH" sz="2400" dirty="0"/>
-              <a:t> (</a:t>
-            </a:r>
-            <a:r>
-              <a:rPr lang="de-CH" sz="2400" dirty="0" err="1"/>
-              <a:t>see</a:t>
-            </a:r>
-            <a:r>
-              <a:rPr lang="de-CH" sz="2400" dirty="0"/>
-              <a:t> following </a:t>
-            </a:r>
-            <a:r>
-              <a:rPr lang="de-CH" sz="2400" dirty="0" err="1"/>
-              <a:t>slides</a:t>
-            </a:r>
-            <a:r>
-              <a:rPr lang="de-CH" sz="2400" dirty="0"/>
-              <a:t> to </a:t>
-            </a:r>
-            <a:r>
-              <a:rPr lang="de-CH" sz="2400" dirty="0" err="1"/>
-              <a:t>see</a:t>
-            </a:r>
-            <a:r>
-              <a:rPr lang="de-CH" sz="2400" dirty="0"/>
-              <a:t> how)</a:t>
-            </a:r>
-            <a:endParaRPr lang="en-CH" sz="2400" dirty="0"/>
-          </a:p>
-        </p:txBody>
-      </p:sp>
-      <p:sp>
-        <p:nvSpPr>
-          <p:cNvPr id="17" name="Rectangle 16">
-            <a:extLst>
-              <a:ext uri="{FF2B5EF4-FFF2-40B4-BE49-F238E27FC236}">
-                <a16:creationId xmlns:a16="http://schemas.microsoft.com/office/drawing/2014/main" id="{1AC19E41-BCF2-4F35-97A7-2A45ED58A517}"/>
-              </a:ext>
-              <a:ext uri="{C183D7F6-B498-43B3-948B-1728B52AA6E4}">
-                <adec:decorative xmlns:adec="http://schemas.microsoft.com/office/drawing/2017/decorative" val="1"/>
-              </a:ext>
-            </a:extLst>
-          </p:cNvPr>
-          <p:cNvSpPr>
-            <a:spLocks noGrp="1" noRot="1" noChangeAspect="1" noMove="1" noResize="1" noEditPoints="1" noAdjustHandles="1" noChangeArrowheads="1" noChangeShapeType="1" noTextEdit="1"/>
-          </p:cNvSpPr>
-          <p:nvPr>
-            <p:extLst>
-              <p:ext uri="{386F3935-93C4-4BCD-93E2-E3B085C9AB24}">
-                <p16:designElem xmlns:p16="http://schemas.microsoft.com/office/powerpoint/2015/main" val="1"/>
-              </p:ext>
-            </p:extLst>
-          </p:nvPr>
-        </p:nvSpPr>
-        <p:spPr>
-          <a:xfrm>
-            <a:off x="4647674" y="3686783"/>
-            <a:ext cx="6579124" cy="2203878"/>
-          </a:xfrm>
-          <a:prstGeom prst="rect">
-            <a:avLst/>
-          </a:prstGeom>
-          <a:solidFill>
-            <a:srgbClr val="FFFFFF"/>
-          </a:solidFill>
-          <a:ln>
-            <a:noFill/>
-          </a:ln>
-        </p:spPr>
-        <p:style>
-          <a:lnRef idx="2">
-            <a:schemeClr val="accent1">
-              <a:shade val="50000"/>
-            </a:schemeClr>
-          </a:lnRef>
-          <a:fillRef idx="1">
-            <a:schemeClr val="accent1"/>
-          </a:fillRef>
-          <a:effectRef idx="0">
-            <a:schemeClr val="accent1"/>
-          </a:effectRef>
-          <a:fontRef idx="minor">
-            <a:schemeClr val="lt1"/>
-          </a:fontRef>
-        </p:style>
-        <p:txBody>
-          <a:bodyPr rtlCol="0" anchor="ctr"/>
-          <a:lstStyle/>
-          <a:p>
-            <a:pPr marL="0" marR="0" lvl="0" indent="0" algn="ctr" defTabSz="914400" rtl="0" eaLnBrk="1" fontAlgn="auto" latinLnBrk="0" hangingPunct="1">
-              <a:lnSpc>
-                <a:spcPct val="100000"/>
-              </a:lnSpc>
-              <a:spcBef>
-                <a:spcPts val="0"/>
-              </a:spcBef>
-              <a:spcAft>
-                <a:spcPts val="0"/>
-              </a:spcAft>
-              <a:buClrTx/>
-              <a:buSzTx/>
-              <a:buFontTx/>
-              <a:buNone/>
-              <a:tabLst/>
-              <a:defRPr/>
-            </a:pPr>
-            <a:endParaRPr kumimoji="0" lang="en-US" sz="1800" b="0" i="0" u="none" strike="noStrike" kern="1200" cap="none" spc="0" normalizeH="0" baseline="0" noProof="0">
-              <a:ln>
-                <a:noFill/>
-              </a:ln>
-              <a:solidFill>
-                <a:prstClr val="white"/>
-              </a:solidFill>
-              <a:effectLst/>
-              <a:uLnTx/>
-              <a:uFillTx/>
-              <a:latin typeface="Calibri" panose="020F0502020204030204"/>
-              <a:ea typeface="+mn-ea"/>
-              <a:cs typeface="+mn-cs"/>
-            </a:endParaRPr>
-          </a:p>
-        </p:txBody>
-      </p:sp>
-      <p:pic>
-        <p:nvPicPr>
-          <p:cNvPr id="4" name="Picture 3">
-            <a:extLst>
-              <a:ext uri="{FF2B5EF4-FFF2-40B4-BE49-F238E27FC236}">
-                <a16:creationId xmlns:a16="http://schemas.microsoft.com/office/drawing/2014/main" id="{3FF10D31-D186-4CB3-9FE9-11B6A03B5C6E}"/>
-              </a:ext>
-            </a:extLst>
-          </p:cNvPr>
-          <p:cNvPicPr>
-            <a:picLocks noChangeAspect="1"/>
-          </p:cNvPicPr>
-          <p:nvPr/>
-        </p:nvPicPr>
-        <p:blipFill>
-          <a:blip r:embed="rId2"/>
-          <a:stretch>
-            <a:fillRect/>
-          </a:stretch>
-        </p:blipFill>
-        <p:spPr>
-          <a:xfrm>
-            <a:off x="4819145" y="3847650"/>
-            <a:ext cx="6221960" cy="1882144"/>
-          </a:xfrm>
-          <a:prstGeom prst="rect">
-            <a:avLst/>
-          </a:prstGeom>
-          <a:ln w="31750" cap="sq">
-            <a:noFill/>
-            <a:miter lim="800000"/>
-          </a:ln>
-        </p:spPr>
-      </p:pic>
-    </p:spTree>
-    <p:extLst>
-      <p:ext uri="{BB962C8B-B14F-4D97-AF65-F5344CB8AC3E}">
-        <p14:creationId xmlns:p14="http://schemas.microsoft.com/office/powerpoint/2010/main" val="2209456905"/>
-      </p:ext>
-    </p:extLst>
-  </p:cSld>
-  <p:clrMapOvr>
-    <a:masterClrMapping/>
-  </p:clrMapOvr>
-</p:sld>
-</file>
-
-<file path=ppt/slides/slide9.xml><?xml version="1.0" encoding="utf-8"?>
 <p:sld xmlns:a="http://schemas.openxmlformats.org/drawingml/2006/main" xmlns:r="http://schemas.openxmlformats.org/officeDocument/2006/relationships" xmlns:p="http://schemas.openxmlformats.org/presentationml/2006/main">
   <p:cSld>
     <p:bg>
@@ -5607,7 +5533,7 @@
           <p:cNvPr id="2" name="Title 1">
             <a:extLst>
               <a:ext uri="{FF2B5EF4-FFF2-40B4-BE49-F238E27FC236}">
-                <a16:creationId xmlns:a16="http://schemas.microsoft.com/office/drawing/2014/main" id="{6763B5EE-D347-47DD-A71D-182D0BEC7DA8}"/>
+                <a16:creationId xmlns:a16="http://schemas.microsoft.com/office/drawing/2014/main" id="{1161174F-76FD-4B60-8A30-76467EC42E76}"/>
               </a:ext>
             </a:extLst>
           </p:cNvPr>
@@ -5631,46 +5557,6 @@
           <a:lstStyle/>
           <a:p>
             <a:pPr algn="r"/>
-            <a:r>
-              <a:rPr lang="de-CH" sz="5400" dirty="0">
-                <a:solidFill>
-                  <a:schemeClr val="accent1"/>
-                </a:solidFill>
-              </a:rPr>
-              <a:t>How to </a:t>
-            </a:r>
-            <a:r>
-              <a:rPr lang="de-CH" sz="5400" dirty="0" err="1">
-                <a:solidFill>
-                  <a:schemeClr val="accent1"/>
-                </a:solidFill>
-              </a:rPr>
-              <a:t>create</a:t>
-            </a:r>
-            <a:r>
-              <a:rPr lang="de-CH" sz="5400" dirty="0">
-                <a:solidFill>
-                  <a:schemeClr val="accent1"/>
-                </a:solidFill>
-              </a:rPr>
-              <a:t> an </a:t>
-            </a:r>
-            <a:r>
-              <a:rPr lang="de-CH" sz="5400" dirty="0" err="1">
-                <a:solidFill>
-                  <a:schemeClr val="accent1"/>
-                </a:solidFill>
-              </a:rPr>
-              <a:t>issue</a:t>
-            </a:r>
-            <a:r>
-              <a:rPr lang="de-CH" sz="5400" dirty="0">
-                <a:solidFill>
-                  <a:schemeClr val="accent1"/>
-                </a:solidFill>
-              </a:rPr>
-              <a:t> in </a:t>
-            </a:r>
             <a:r>
               <a:rPr lang="de-CH" sz="5400" dirty="0" err="1">
                 <a:solidFill>
@@ -5747,7 +5633,7 @@
           <p:cNvPr id="3" name="Content Placeholder 2">
             <a:extLst>
               <a:ext uri="{FF2B5EF4-FFF2-40B4-BE49-F238E27FC236}">
-                <a16:creationId xmlns:a16="http://schemas.microsoft.com/office/drawing/2014/main" id="{FF6AF418-8710-4CF6-B2D6-474235BB399C}"/>
+                <a16:creationId xmlns:a16="http://schemas.microsoft.com/office/drawing/2014/main" id="{67CB4536-0B83-4B37-ACFA-0A0E9AE09E67}"/>
               </a:ext>
             </a:extLst>
           </p:cNvPr>
@@ -5766,37 +5652,21 @@
         </p:spPr>
         <p:txBody>
           <a:bodyPr anchor="ctr">
-            <a:normAutofit/>
+            <a:normAutofit lnSpcReduction="10000"/>
           </a:bodyPr>
           <a:lstStyle/>
           <a:p>
             <a:r>
               <a:rPr lang="de-CH" dirty="0"/>
-              <a:t>To </a:t>
+              <a:t>You will find </a:t>
             </a:r>
             <a:r>
               <a:rPr lang="de-CH" dirty="0" err="1"/>
-              <a:t>learn</a:t>
-            </a:r>
-            <a:r>
-              <a:rPr lang="de-CH" dirty="0"/>
-              <a:t> how to </a:t>
-            </a:r>
-            <a:r>
-              <a:rPr lang="de-CH" dirty="0" err="1"/>
-              <a:t>create</a:t>
-            </a:r>
-            <a:r>
-              <a:rPr lang="de-CH" dirty="0"/>
-              <a:t> a </a:t>
-            </a:r>
-            <a:r>
-              <a:rPr lang="de-CH" dirty="0" err="1"/>
-              <a:t>bug</a:t>
-            </a:r>
-            <a:r>
-              <a:rPr lang="de-CH" dirty="0"/>
-              <a:t> in </a:t>
+              <a:t>everything</a:t>
+            </a:r>
+            <a:r>
+              <a:rPr lang="de-CH" dirty="0"/>
+              <a:t> on </a:t>
             </a:r>
             <a:r>
               <a:rPr lang="de-CH" dirty="0" err="1"/>
@@ -5804,15 +5674,7 @@
             </a:r>
             <a:r>
               <a:rPr lang="de-CH" dirty="0"/>
-              <a:t> you </a:t>
-            </a:r>
-            <a:r>
-              <a:rPr lang="de-CH" dirty="0" err="1"/>
-              <a:t>can</a:t>
-            </a:r>
-            <a:r>
-              <a:rPr lang="de-CH" dirty="0"/>
-              <a:t> follow </a:t>
+              <a:t> at </a:t>
             </a:r>
             <a:r>
               <a:rPr lang="de-CH" dirty="0" err="1"/>
@@ -5820,66 +5682,717 @@
             </a:r>
             <a:r>
               <a:rPr lang="de-CH" dirty="0"/>
-              <a:t> easy </a:t>
+              <a:t> link</a:t>
+            </a:r>
+          </a:p>
+          <a:p>
+            <a:pPr marL="0" indent="0">
+              <a:buNone/>
+            </a:pPr>
+            <a:endParaRPr lang="de-CH" dirty="0"/>
+          </a:p>
+          <a:p>
+            <a:pPr marL="0" indent="0" algn="ctr">
+              <a:buNone/>
+            </a:pPr>
+            <a:r>
+              <a:rPr lang="de-CH" dirty="0">
+                <a:hlinkClick r:id="rId2"/>
+              </a:rPr>
+              <a:t>https://github.com/michelucci/dlcourse2018_students</a:t>
+            </a:r>
+            <a:r>
+              <a:rPr lang="de-CH" dirty="0"/>
+              <a:t> </a:t>
+            </a:r>
+          </a:p>
+          <a:p>
+            <a:pPr marL="0" indent="0" algn="ctr">
+              <a:buNone/>
+            </a:pPr>
+            <a:r>
+              <a:rPr lang="de-CH" dirty="0"/>
+              <a:t>(or if you </a:t>
             </a:r>
             <a:r>
               <a:rPr lang="de-CH" dirty="0" err="1"/>
-              <a:t>guide</a:t>
-            </a:r>
-            <a:r>
-              <a:rPr lang="de-CH" dirty="0"/>
-              <a:t> from </a:t>
+              <a:t>want</a:t>
+            </a:r>
+            <a:r>
+              <a:rPr lang="de-CH" dirty="0"/>
+              <a:t> to type </a:t>
+            </a:r>
+            <a:r>
+              <a:rPr lang="de-CH" dirty="0" err="1"/>
+              <a:t>it</a:t>
+            </a:r>
+            <a:r>
+              <a:rPr lang="de-CH" dirty="0"/>
+              <a:t> </a:t>
+            </a:r>
+            <a:r>
+              <a:rPr lang="de-CH" dirty="0">
+                <a:hlinkClick r:id="rId3"/>
+              </a:rPr>
+              <a:t>https://goo.gl/CgDbUH</a:t>
+            </a:r>
+            <a:r>
+              <a:rPr lang="de-CH" dirty="0"/>
+              <a:t>) </a:t>
+            </a:r>
+          </a:p>
+          <a:p>
+            <a:pPr marL="0" indent="0">
+              <a:buNone/>
+            </a:pPr>
+            <a:endParaRPr lang="de-CH" dirty="0"/>
+          </a:p>
+          <a:p>
+            <a:r>
+              <a:rPr lang="de-CH" dirty="0"/>
+              <a:t>On </a:t>
             </a:r>
             <a:r>
               <a:rPr lang="de-CH" dirty="0" err="1"/>
               <a:t>github</a:t>
             </a:r>
-            <a:endParaRPr lang="de-CH" dirty="0"/>
-          </a:p>
-          <a:p>
-            <a:pPr marL="0" indent="0" algn="ctr">
-              <a:buNone/>
-            </a:pPr>
-            <a:r>
-              <a:rPr lang="en-GB" dirty="0">
-                <a:hlinkClick r:id="rId2"/>
-              </a:rPr>
-              <a:t>https://help.github.com/articles/creating-an-issue/</a:t>
-            </a:r>
-            <a:endParaRPr lang="en-GB" dirty="0"/>
-          </a:p>
-          <a:p>
-            <a:pPr marL="0" indent="0" algn="ctr">
-              <a:buNone/>
-            </a:pPr>
-            <a:r>
-              <a:rPr lang="en-GB" dirty="0"/>
-              <a:t>(or if you want to type </a:t>
-            </a:r>
-            <a:r>
-              <a:rPr lang="en-GB" dirty="0">
-                <a:hlinkClick r:id="rId3"/>
-              </a:rPr>
-              <a:t>https://goo.gl/294qg4</a:t>
-            </a:r>
-            <a:r>
-              <a:rPr lang="en-GB" dirty="0"/>
-              <a:t>) </a:t>
-            </a:r>
-            <a:endParaRPr lang="de-CH" dirty="0"/>
-          </a:p>
-          <a:p>
-            <a:pPr marL="0" indent="0">
-              <a:buNone/>
-            </a:pPr>
-            <a:endParaRPr lang="en-GB" dirty="0"/>
+            <a:r>
+              <a:rPr lang="de-CH" dirty="0"/>
+              <a:t> you will find all power </a:t>
+            </a:r>
+            <a:r>
+              <a:rPr lang="de-CH" dirty="0" err="1"/>
+              <a:t>point</a:t>
+            </a:r>
+            <a:r>
+              <a:rPr lang="de-CH" dirty="0"/>
+              <a:t> </a:t>
+            </a:r>
+            <a:r>
+              <a:rPr lang="de-CH" dirty="0" err="1"/>
+              <a:t>presentations</a:t>
+            </a:r>
+            <a:r>
+              <a:rPr lang="de-CH" dirty="0"/>
+              <a:t>, all </a:t>
+            </a:r>
+            <a:r>
+              <a:rPr lang="de-CH" dirty="0" err="1"/>
+              <a:t>jupyter</a:t>
+            </a:r>
+            <a:r>
+              <a:rPr lang="de-CH" dirty="0"/>
+              <a:t> </a:t>
+            </a:r>
+            <a:r>
+              <a:rPr lang="de-CH" dirty="0" err="1"/>
+              <a:t>notebooks</a:t>
+            </a:r>
+            <a:r>
+              <a:rPr lang="de-CH" dirty="0"/>
+              <a:t> and all </a:t>
+            </a:r>
+            <a:r>
+              <a:rPr lang="de-CH" dirty="0" err="1"/>
+              <a:t>datasets</a:t>
+            </a:r>
+            <a:r>
+              <a:rPr lang="de-CH" dirty="0"/>
+              <a:t> that </a:t>
+            </a:r>
+            <a:r>
+              <a:rPr lang="de-CH" dirty="0" err="1"/>
+              <a:t>we</a:t>
+            </a:r>
+            <a:r>
+              <a:rPr lang="de-CH" dirty="0"/>
+              <a:t> will </a:t>
+            </a:r>
+            <a:r>
+              <a:rPr lang="de-CH" dirty="0" err="1"/>
+              <a:t>use</a:t>
+            </a:r>
+            <a:r>
+              <a:rPr lang="de-CH" dirty="0"/>
+              <a:t> </a:t>
+            </a:r>
+            <a:r>
+              <a:rPr lang="de-CH" dirty="0" err="1"/>
+              <a:t>during</a:t>
+            </a:r>
+            <a:r>
+              <a:rPr lang="de-CH" dirty="0"/>
+              <a:t> </a:t>
+            </a:r>
+            <a:r>
+              <a:rPr lang="de-CH" dirty="0" err="1"/>
+              <a:t>this</a:t>
+            </a:r>
+            <a:r>
+              <a:rPr lang="de-CH" dirty="0"/>
+              <a:t> </a:t>
+            </a:r>
+            <a:r>
+              <a:rPr lang="de-CH" dirty="0" err="1"/>
+              <a:t>course</a:t>
+            </a:r>
+            <a:r>
+              <a:rPr lang="de-CH" dirty="0"/>
+              <a:t>.</a:t>
+            </a:r>
           </a:p>
         </p:txBody>
       </p:sp>
     </p:spTree>
     <p:extLst>
       <p:ext uri="{BB962C8B-B14F-4D97-AF65-F5344CB8AC3E}">
-        <p14:creationId xmlns:p14="http://schemas.microsoft.com/office/powerpoint/2010/main" val="2691658650"/>
+        <p14:creationId xmlns:p14="http://schemas.microsoft.com/office/powerpoint/2010/main" val="1036947648"/>
+      </p:ext>
+    </p:extLst>
+  </p:cSld>
+  <p:clrMapOvr>
+    <a:masterClrMapping/>
+  </p:clrMapOvr>
+</p:sld>
+</file>
+
+<file path=ppt/slides/slide9.xml><?xml version="1.0" encoding="utf-8"?>
+<p:sld xmlns:a="http://schemas.openxmlformats.org/drawingml/2006/main" xmlns:r="http://schemas.openxmlformats.org/officeDocument/2006/relationships" xmlns:p="http://schemas.openxmlformats.org/presentationml/2006/main">
+  <p:cSld>
+    <p:bg>
+      <p:bgPr>
+        <a:solidFill>
+          <a:schemeClr val="bg1">
+            <a:lumMod val="95000"/>
+          </a:schemeClr>
+        </a:solidFill>
+        <a:effectLst/>
+      </p:bgPr>
+    </p:bg>
+    <p:spTree>
+      <p:nvGrpSpPr>
+        <p:cNvPr id="1" name=""/>
+        <p:cNvGrpSpPr/>
+        <p:nvPr/>
+      </p:nvGrpSpPr>
+      <p:grpSpPr>
+        <a:xfrm>
+          <a:off x="0" y="0"/>
+          <a:ext cx="0" cy="0"/>
+          <a:chOff x="0" y="0"/>
+          <a:chExt cx="0" cy="0"/>
+        </a:xfrm>
+      </p:grpSpPr>
+      <p:sp>
+        <p:nvSpPr>
+          <p:cNvPr id="2" name="Title 1">
+            <a:extLst>
+              <a:ext uri="{FF2B5EF4-FFF2-40B4-BE49-F238E27FC236}">
+                <a16:creationId xmlns:a16="http://schemas.microsoft.com/office/drawing/2014/main" id="{72E4DA06-D887-4823-8E43-88EE71716BCE}"/>
+              </a:ext>
+            </a:extLst>
+          </p:cNvPr>
+          <p:cNvSpPr>
+            <a:spLocks noGrp="1"/>
+          </p:cNvSpPr>
+          <p:nvPr>
+            <p:ph type="title"/>
+          </p:nvPr>
+        </p:nvSpPr>
+        <p:spPr>
+          <a:xfrm>
+            <a:off x="643470" y="648269"/>
+            <a:ext cx="3614631" cy="5244531"/>
+          </a:xfrm>
+          <a:solidFill>
+            <a:schemeClr val="bg1">
+              <a:alpha val="70000"/>
+            </a:schemeClr>
+          </a:solidFill>
+          <a:ln w="31750" cap="sq">
+            <a:solidFill>
+              <a:schemeClr val="tx1">
+                <a:lumMod val="75000"/>
+                <a:lumOff val="25000"/>
+              </a:schemeClr>
+            </a:solidFill>
+            <a:miter lim="800000"/>
+          </a:ln>
+        </p:spPr>
+        <p:txBody>
+          <a:bodyPr>
+            <a:normAutofit/>
+          </a:bodyPr>
+          <a:lstStyle/>
+          <a:p>
+            <a:pPr algn="ctr"/>
+            <a:r>
+              <a:rPr lang="de-CH" sz="4000">
+                <a:solidFill>
+                  <a:schemeClr val="tx1">
+                    <a:lumMod val="85000"/>
+                    <a:lumOff val="15000"/>
+                  </a:schemeClr>
+                </a:solidFill>
+              </a:rPr>
+              <a:t>How to send me errors and requests</a:t>
+            </a:r>
+            <a:endParaRPr lang="en-CH" sz="4000">
+              <a:solidFill>
+                <a:schemeClr val="tx1">
+                  <a:lumMod val="85000"/>
+                  <a:lumOff val="15000"/>
+                </a:schemeClr>
+              </a:solidFill>
+            </a:endParaRPr>
+          </a:p>
+        </p:txBody>
+      </p:sp>
+      <p:sp>
+        <p:nvSpPr>
+          <p:cNvPr id="3" name="Content Placeholder 2">
+            <a:extLst>
+              <a:ext uri="{FF2B5EF4-FFF2-40B4-BE49-F238E27FC236}">
+                <a16:creationId xmlns:a16="http://schemas.microsoft.com/office/drawing/2014/main" id="{93C3B092-80CD-4E0F-8AEF-5320A7174ABB}"/>
+              </a:ext>
+            </a:extLst>
+          </p:cNvPr>
+          <p:cNvSpPr>
+            <a:spLocks noGrp="1"/>
+          </p:cNvSpPr>
+          <p:nvPr>
+            <p:ph idx="1"/>
+          </p:nvPr>
+        </p:nvSpPr>
+        <p:spPr>
+          <a:xfrm>
+            <a:off x="4672101" y="648269"/>
+            <a:ext cx="6876429" cy="2649877"/>
+          </a:xfrm>
+        </p:spPr>
+        <p:txBody>
+          <a:bodyPr>
+            <a:normAutofit lnSpcReduction="10000"/>
+          </a:bodyPr>
+          <a:lstStyle/>
+          <a:p>
+            <a:pPr marL="0" indent="0">
+              <a:buNone/>
+            </a:pPr>
+            <a:r>
+              <a:rPr lang="de-CH" sz="2400" dirty="0"/>
+              <a:t>I am not </a:t>
+            </a:r>
+            <a:r>
+              <a:rPr lang="de-CH" sz="2400" dirty="0" err="1"/>
+              <a:t>perfect</a:t>
+            </a:r>
+            <a:r>
+              <a:rPr lang="de-CH" sz="2400" dirty="0"/>
+              <a:t> so </a:t>
+            </a:r>
+            <a:r>
+              <a:rPr lang="de-CH" sz="2400" dirty="0" err="1"/>
+              <a:t>the</a:t>
+            </a:r>
+            <a:r>
+              <a:rPr lang="de-CH" sz="2400" dirty="0"/>
+              <a:t> </a:t>
+            </a:r>
+            <a:r>
+              <a:rPr lang="de-CH" sz="2400" dirty="0" err="1"/>
+              <a:t>probability</a:t>
+            </a:r>
+            <a:r>
+              <a:rPr lang="de-CH" sz="2400" dirty="0"/>
+              <a:t> that you will find </a:t>
+            </a:r>
+            <a:r>
+              <a:rPr lang="de-CH" sz="2400" dirty="0" err="1"/>
+              <a:t>errors</a:t>
+            </a:r>
+            <a:r>
+              <a:rPr lang="de-CH" sz="2400" dirty="0"/>
+              <a:t> in </a:t>
+            </a:r>
+            <a:r>
+              <a:rPr lang="de-CH" sz="2400" dirty="0" err="1"/>
+              <a:t>the</a:t>
+            </a:r>
+            <a:r>
+              <a:rPr lang="de-CH" sz="2400" dirty="0"/>
+              <a:t> </a:t>
+            </a:r>
+            <a:r>
+              <a:rPr lang="de-CH" sz="2400" dirty="0" err="1"/>
+              <a:t>powerpoint</a:t>
+            </a:r>
+            <a:r>
+              <a:rPr lang="de-CH" sz="2400" dirty="0"/>
+              <a:t> </a:t>
+            </a:r>
+            <a:r>
+              <a:rPr lang="de-CH" sz="2400" dirty="0" err="1"/>
+              <a:t>presentations</a:t>
+            </a:r>
+            <a:r>
+              <a:rPr lang="de-CH" sz="2400" dirty="0"/>
+              <a:t> or (</a:t>
+            </a:r>
+            <a:r>
+              <a:rPr lang="de-CH" sz="2400" dirty="0" err="1"/>
+              <a:t>especially</a:t>
+            </a:r>
+            <a:r>
+              <a:rPr lang="de-CH" sz="2400" dirty="0"/>
+              <a:t>) in </a:t>
+            </a:r>
+            <a:r>
+              <a:rPr lang="de-CH" sz="2400" dirty="0" err="1"/>
+              <a:t>the</a:t>
+            </a:r>
+            <a:r>
+              <a:rPr lang="de-CH" sz="2400" dirty="0"/>
+              <a:t> </a:t>
+            </a:r>
+            <a:r>
+              <a:rPr lang="de-CH" sz="2400" dirty="0" err="1"/>
+              <a:t>code</a:t>
+            </a:r>
+            <a:r>
+              <a:rPr lang="de-CH" sz="2400" dirty="0"/>
+              <a:t> </a:t>
+            </a:r>
+            <a:r>
+              <a:rPr lang="de-CH" sz="2400" dirty="0" err="1"/>
+              <a:t>exampels</a:t>
+            </a:r>
+            <a:r>
+              <a:rPr lang="de-CH" sz="2400" dirty="0"/>
+              <a:t> (</a:t>
+            </a:r>
+            <a:r>
+              <a:rPr lang="de-CH" sz="2400" dirty="0" err="1"/>
+              <a:t>the</a:t>
+            </a:r>
+            <a:r>
+              <a:rPr lang="de-CH" sz="2400" dirty="0"/>
+              <a:t> </a:t>
+            </a:r>
+            <a:r>
+              <a:rPr lang="de-CH" sz="2400" dirty="0" err="1"/>
+              <a:t>jupyter</a:t>
+            </a:r>
+            <a:r>
+              <a:rPr lang="de-CH" sz="2400" dirty="0"/>
+              <a:t> </a:t>
+            </a:r>
+            <a:r>
+              <a:rPr lang="de-CH" sz="2400" dirty="0" err="1"/>
+              <a:t>notebooks</a:t>
+            </a:r>
+            <a:r>
+              <a:rPr lang="de-CH" sz="2400" dirty="0"/>
+              <a:t>) is not </a:t>
+            </a:r>
+            <a:r>
+              <a:rPr lang="de-CH" sz="2400" dirty="0" err="1"/>
+              <a:t>zero</a:t>
+            </a:r>
+            <a:r>
+              <a:rPr lang="de-CH" sz="2400" dirty="0"/>
+              <a:t>. In </a:t>
+            </a:r>
+            <a:r>
+              <a:rPr lang="de-CH" sz="2400" dirty="0" err="1"/>
+              <a:t>case</a:t>
+            </a:r>
+            <a:r>
+              <a:rPr lang="de-CH" sz="2400" dirty="0"/>
+              <a:t> you do, </a:t>
+            </a:r>
+            <a:r>
+              <a:rPr lang="de-CH" sz="2400" dirty="0" err="1"/>
+              <a:t>please</a:t>
+            </a:r>
+            <a:r>
+              <a:rPr lang="de-CH" sz="2400" dirty="0"/>
+              <a:t> send </a:t>
+            </a:r>
+            <a:r>
+              <a:rPr lang="de-CH" sz="2400" dirty="0" err="1"/>
+              <a:t>me</a:t>
+            </a:r>
+            <a:r>
+              <a:rPr lang="de-CH" sz="2400" dirty="0"/>
+              <a:t> </a:t>
+            </a:r>
+            <a:r>
+              <a:rPr lang="de-CH" sz="2400" dirty="0" err="1"/>
+              <a:t>the</a:t>
+            </a:r>
+            <a:r>
+              <a:rPr lang="de-CH" sz="2400" dirty="0"/>
+              <a:t> </a:t>
+            </a:r>
+            <a:r>
+              <a:rPr lang="de-CH" sz="2400" dirty="0" err="1"/>
+              <a:t>bugs</a:t>
+            </a:r>
+            <a:r>
+              <a:rPr lang="de-CH" sz="2400" dirty="0"/>
+              <a:t>. To make </a:t>
+            </a:r>
+            <a:r>
+              <a:rPr lang="de-CH" sz="2400" dirty="0" err="1"/>
+              <a:t>the</a:t>
+            </a:r>
+            <a:r>
+              <a:rPr lang="de-CH" sz="2400" dirty="0"/>
+              <a:t> </a:t>
+            </a:r>
+            <a:r>
+              <a:rPr lang="de-CH" sz="2400" dirty="0" err="1"/>
+              <a:t>bugs</a:t>
+            </a:r>
+            <a:r>
+              <a:rPr lang="de-CH" sz="2400" dirty="0"/>
+              <a:t> </a:t>
+            </a:r>
+            <a:r>
+              <a:rPr lang="de-CH" sz="2400" dirty="0" err="1"/>
+              <a:t>easier</a:t>
+            </a:r>
+            <a:r>
+              <a:rPr lang="de-CH" sz="2400" dirty="0"/>
+              <a:t> to correct (for </a:t>
+            </a:r>
+            <a:r>
+              <a:rPr lang="de-CH" sz="2400" dirty="0" err="1"/>
+              <a:t>me</a:t>
+            </a:r>
+            <a:r>
+              <a:rPr lang="de-CH" sz="2400" dirty="0"/>
+              <a:t>) and </a:t>
+            </a:r>
+            <a:r>
+              <a:rPr lang="de-CH" sz="2400" dirty="0" err="1"/>
+              <a:t>easier</a:t>
+            </a:r>
+            <a:r>
+              <a:rPr lang="de-CH" sz="2400" dirty="0"/>
+              <a:t> to check (for you) </a:t>
+            </a:r>
+            <a:r>
+              <a:rPr lang="de-CH" sz="2400" dirty="0" err="1"/>
+              <a:t>please</a:t>
+            </a:r>
+            <a:r>
+              <a:rPr lang="de-CH" sz="2400" dirty="0"/>
+              <a:t> </a:t>
+            </a:r>
+            <a:r>
+              <a:rPr lang="de-CH" sz="2400" dirty="0" err="1"/>
+              <a:t>use</a:t>
+            </a:r>
+            <a:r>
+              <a:rPr lang="de-CH" sz="2400" dirty="0"/>
+              <a:t> </a:t>
+            </a:r>
+            <a:r>
+              <a:rPr lang="de-CH" sz="2400" dirty="0" err="1"/>
+              <a:t>the</a:t>
+            </a:r>
+            <a:r>
+              <a:rPr lang="de-CH" sz="2400" dirty="0"/>
+              <a:t> </a:t>
+            </a:r>
+            <a:r>
+              <a:rPr lang="de-CH" sz="2400" b="1" dirty="0"/>
+              <a:t>«New </a:t>
+            </a:r>
+            <a:r>
+              <a:rPr lang="de-CH" sz="2400" b="1" dirty="0" err="1"/>
+              <a:t>Issue</a:t>
+            </a:r>
+            <a:r>
+              <a:rPr lang="de-CH" sz="2400" b="1" dirty="0"/>
+              <a:t>» </a:t>
+            </a:r>
+            <a:r>
+              <a:rPr lang="de-CH" sz="2400" dirty="0" err="1"/>
+              <a:t>functionality</a:t>
+            </a:r>
+            <a:r>
+              <a:rPr lang="de-CH" sz="2400" dirty="0"/>
+              <a:t> in </a:t>
+            </a:r>
+            <a:r>
+              <a:rPr lang="de-CH" sz="2400" dirty="0" err="1"/>
+              <a:t>github</a:t>
+            </a:r>
+            <a:r>
+              <a:rPr lang="de-CH" sz="2400" dirty="0"/>
+              <a:t> (</a:t>
+            </a:r>
+            <a:r>
+              <a:rPr lang="de-CH" sz="2400" dirty="0" err="1"/>
+              <a:t>see</a:t>
+            </a:r>
+            <a:r>
+              <a:rPr lang="de-CH" sz="2400" dirty="0"/>
+              <a:t> following </a:t>
+            </a:r>
+            <a:r>
+              <a:rPr lang="de-CH" sz="2400" dirty="0" err="1"/>
+              <a:t>slides</a:t>
+            </a:r>
+            <a:r>
+              <a:rPr lang="de-CH" sz="2400" dirty="0"/>
+              <a:t> to </a:t>
+            </a:r>
+            <a:r>
+              <a:rPr lang="de-CH" sz="2400" dirty="0" err="1"/>
+              <a:t>see</a:t>
+            </a:r>
+            <a:r>
+              <a:rPr lang="de-CH" sz="2400" dirty="0"/>
+              <a:t> how)</a:t>
+            </a:r>
+            <a:endParaRPr lang="en-CH" sz="2400" dirty="0"/>
+          </a:p>
+        </p:txBody>
+      </p:sp>
+      <p:sp>
+        <p:nvSpPr>
+          <p:cNvPr id="17" name="Rectangle 16">
+            <a:extLst>
+              <a:ext uri="{FF2B5EF4-FFF2-40B4-BE49-F238E27FC236}">
+                <a16:creationId xmlns:a16="http://schemas.microsoft.com/office/drawing/2014/main" id="{1AC19E41-BCF2-4F35-97A7-2A45ED58A517}"/>
+              </a:ext>
+              <a:ext uri="{C183D7F6-B498-43B3-948B-1728B52AA6E4}">
+                <adec:decorative xmlns:adec="http://schemas.microsoft.com/office/drawing/2017/decorative" val="1"/>
+              </a:ext>
+            </a:extLst>
+          </p:cNvPr>
+          <p:cNvSpPr>
+            <a:spLocks noGrp="1" noRot="1" noChangeAspect="1" noMove="1" noResize="1" noEditPoints="1" noAdjustHandles="1" noChangeArrowheads="1" noChangeShapeType="1" noTextEdit="1"/>
+          </p:cNvSpPr>
+          <p:nvPr>
+            <p:extLst>
+              <p:ext uri="{386F3935-93C4-4BCD-93E2-E3B085C9AB24}">
+                <p16:designElem xmlns:p16="http://schemas.microsoft.com/office/powerpoint/2015/main" val="1"/>
+              </p:ext>
+            </p:extLst>
+          </p:nvPr>
+        </p:nvSpPr>
+        <p:spPr>
+          <a:xfrm>
+            <a:off x="4647674" y="3686783"/>
+            <a:ext cx="6579124" cy="2203878"/>
+          </a:xfrm>
+          <a:prstGeom prst="rect">
+            <a:avLst/>
+          </a:prstGeom>
+          <a:solidFill>
+            <a:srgbClr val="FFFFFF"/>
+          </a:solidFill>
+          <a:ln>
+            <a:noFill/>
+          </a:ln>
+        </p:spPr>
+        <p:style>
+          <a:lnRef idx="2">
+            <a:schemeClr val="accent1">
+              <a:shade val="50000"/>
+            </a:schemeClr>
+          </a:lnRef>
+          <a:fillRef idx="1">
+            <a:schemeClr val="accent1"/>
+          </a:fillRef>
+          <a:effectRef idx="0">
+            <a:schemeClr val="accent1"/>
+          </a:effectRef>
+          <a:fontRef idx="minor">
+            <a:schemeClr val="lt1"/>
+          </a:fontRef>
+        </p:style>
+        <p:txBody>
+          <a:bodyPr rtlCol="0" anchor="ctr"/>
+          <a:lstStyle/>
+          <a:p>
+            <a:pPr marL="0" marR="0" lvl="0" indent="0" algn="ctr" defTabSz="914400" rtl="0" eaLnBrk="1" fontAlgn="auto" latinLnBrk="0" hangingPunct="1">
+              <a:lnSpc>
+                <a:spcPct val="100000"/>
+              </a:lnSpc>
+              <a:spcBef>
+                <a:spcPts val="0"/>
+              </a:spcBef>
+              <a:spcAft>
+                <a:spcPts val="0"/>
+              </a:spcAft>
+              <a:buClrTx/>
+              <a:buSzTx/>
+              <a:buFontTx/>
+              <a:buNone/>
+              <a:tabLst/>
+              <a:defRPr/>
+            </a:pPr>
+            <a:endParaRPr kumimoji="0" lang="en-US" sz="1800" b="0" i="0" u="none" strike="noStrike" kern="1200" cap="none" spc="0" normalizeH="0" baseline="0" noProof="0">
+              <a:ln>
+                <a:noFill/>
+              </a:ln>
+              <a:solidFill>
+                <a:prstClr val="white"/>
+              </a:solidFill>
+              <a:effectLst/>
+              <a:uLnTx/>
+              <a:uFillTx/>
+              <a:latin typeface="Calibri" panose="020F0502020204030204"/>
+              <a:ea typeface="+mn-ea"/>
+              <a:cs typeface="+mn-cs"/>
+            </a:endParaRPr>
+          </a:p>
+        </p:txBody>
+      </p:sp>
+      <p:pic>
+        <p:nvPicPr>
+          <p:cNvPr id="4" name="Picture 3">
+            <a:extLst>
+              <a:ext uri="{FF2B5EF4-FFF2-40B4-BE49-F238E27FC236}">
+                <a16:creationId xmlns:a16="http://schemas.microsoft.com/office/drawing/2014/main" id="{3FF10D31-D186-4CB3-9FE9-11B6A03B5C6E}"/>
+              </a:ext>
+            </a:extLst>
+          </p:cNvPr>
+          <p:cNvPicPr>
+            <a:picLocks noChangeAspect="1"/>
+          </p:cNvPicPr>
+          <p:nvPr/>
+        </p:nvPicPr>
+        <p:blipFill>
+          <a:blip r:embed="rId2"/>
+          <a:stretch>
+            <a:fillRect/>
+          </a:stretch>
+        </p:blipFill>
+        <p:spPr>
+          <a:xfrm>
+            <a:off x="4819145" y="3847650"/>
+            <a:ext cx="6221960" cy="1882144"/>
+          </a:xfrm>
+          <a:prstGeom prst="rect">
+            <a:avLst/>
+          </a:prstGeom>
+          <a:ln w="31750" cap="sq">
+            <a:noFill/>
+            <a:miter lim="800000"/>
+          </a:ln>
+        </p:spPr>
+      </p:pic>
+    </p:spTree>
+    <p:extLst>
+      <p:ext uri="{BB962C8B-B14F-4D97-AF65-F5344CB8AC3E}">
+        <p14:creationId xmlns:p14="http://schemas.microsoft.com/office/powerpoint/2010/main" val="2209456905"/>
       </p:ext>
     </p:extLst>
   </p:cSld>

</xml_diff>